<commit_message>
refatorando artefatos 20e 21 - feedback ac4
</commit_message>
<xml_diff>
--- a/artefatos/20 - Modelo Conceitual de Negócio.pptx
+++ b/artefatos/20 - Modelo Conceitual de Negócio.pptx
@@ -154,10 +154,9 @@
           </a:lstStyle>
           <a:p>
             <a:r>
-              <a:rPr lang="pt-BR" smtClean="0"/>
+              <a:rPr lang="pt-BR"/>
               <a:t>Clique para editar o título mestre</a:t>
             </a:r>
-            <a:endParaRPr lang="pt-BR"/>
           </a:p>
         </p:txBody>
       </p:sp>
@@ -219,10 +218,9 @@
           </a:lstStyle>
           <a:p>
             <a:r>
-              <a:rPr lang="pt-BR" smtClean="0"/>
+              <a:rPr lang="pt-BR"/>
               <a:t>Clique para editar o estilo do subtítulo mestre</a:t>
             </a:r>
-            <a:endParaRPr lang="pt-BR"/>
           </a:p>
         </p:txBody>
       </p:sp>
@@ -243,7 +241,7 @@
           <a:p>
             <a:fld id="{6F6F9BBC-5669-453D-8C75-07C41C1632E4}" type="datetimeFigureOut">
               <a:rPr lang="pt-BR" smtClean="0"/>
-              <a:t>23/10/2020</a:t>
+              <a:t>12/11/2020</a:t>
             </a:fld>
             <a:endParaRPr lang="pt-BR"/>
           </a:p>
@@ -337,10 +335,9 @@
           <a:lstStyle/>
           <a:p>
             <a:r>
-              <a:rPr lang="pt-BR" smtClean="0"/>
+              <a:rPr lang="pt-BR"/>
               <a:t>Clique para editar o título mestre</a:t>
             </a:r>
-            <a:endParaRPr lang="pt-BR"/>
           </a:p>
         </p:txBody>
       </p:sp>
@@ -361,38 +358,37 @@
           <a:p>
             <a:pPr lvl="0"/>
             <a:r>
-              <a:rPr lang="pt-BR" smtClean="0"/>
+              <a:rPr lang="pt-BR"/>
               <a:t>Clique para editar o texto mestre</a:t>
             </a:r>
           </a:p>
           <a:p>
             <a:pPr lvl="1"/>
             <a:r>
-              <a:rPr lang="pt-BR" smtClean="0"/>
+              <a:rPr lang="pt-BR"/>
               <a:t>Segundo nível</a:t>
             </a:r>
           </a:p>
           <a:p>
             <a:pPr lvl="2"/>
             <a:r>
-              <a:rPr lang="pt-BR" smtClean="0"/>
+              <a:rPr lang="pt-BR"/>
               <a:t>Terceiro nível</a:t>
             </a:r>
           </a:p>
           <a:p>
             <a:pPr lvl="3"/>
             <a:r>
-              <a:rPr lang="pt-BR" smtClean="0"/>
+              <a:rPr lang="pt-BR"/>
               <a:t>Quarto nível</a:t>
             </a:r>
           </a:p>
           <a:p>
             <a:pPr lvl="4"/>
             <a:r>
-              <a:rPr lang="pt-BR" smtClean="0"/>
+              <a:rPr lang="pt-BR"/>
               <a:t>Quinto nível</a:t>
             </a:r>
-            <a:endParaRPr lang="pt-BR"/>
           </a:p>
         </p:txBody>
       </p:sp>
@@ -413,7 +409,7 @@
           <a:p>
             <a:fld id="{6F6F9BBC-5669-453D-8C75-07C41C1632E4}" type="datetimeFigureOut">
               <a:rPr lang="pt-BR" smtClean="0"/>
-              <a:t>23/10/2020</a:t>
+              <a:t>12/11/2020</a:t>
             </a:fld>
             <a:endParaRPr lang="pt-BR"/>
           </a:p>
@@ -512,10 +508,9 @@
           <a:lstStyle/>
           <a:p>
             <a:r>
-              <a:rPr lang="pt-BR" smtClean="0"/>
+              <a:rPr lang="pt-BR"/>
               <a:t>Clique para editar o título mestre</a:t>
             </a:r>
-            <a:endParaRPr lang="pt-BR"/>
           </a:p>
         </p:txBody>
       </p:sp>
@@ -541,38 +536,37 @@
           <a:p>
             <a:pPr lvl="0"/>
             <a:r>
-              <a:rPr lang="pt-BR" smtClean="0"/>
+              <a:rPr lang="pt-BR"/>
               <a:t>Clique para editar o texto mestre</a:t>
             </a:r>
           </a:p>
           <a:p>
             <a:pPr lvl="1"/>
             <a:r>
-              <a:rPr lang="pt-BR" smtClean="0"/>
+              <a:rPr lang="pt-BR"/>
               <a:t>Segundo nível</a:t>
             </a:r>
           </a:p>
           <a:p>
             <a:pPr lvl="2"/>
             <a:r>
-              <a:rPr lang="pt-BR" smtClean="0"/>
+              <a:rPr lang="pt-BR"/>
               <a:t>Terceiro nível</a:t>
             </a:r>
           </a:p>
           <a:p>
             <a:pPr lvl="3"/>
             <a:r>
-              <a:rPr lang="pt-BR" smtClean="0"/>
+              <a:rPr lang="pt-BR"/>
               <a:t>Quarto nível</a:t>
             </a:r>
           </a:p>
           <a:p>
             <a:pPr lvl="4"/>
             <a:r>
-              <a:rPr lang="pt-BR" smtClean="0"/>
+              <a:rPr lang="pt-BR"/>
               <a:t>Quinto nível</a:t>
             </a:r>
-            <a:endParaRPr lang="pt-BR"/>
           </a:p>
         </p:txBody>
       </p:sp>
@@ -593,7 +587,7 @@
           <a:p>
             <a:fld id="{6F6F9BBC-5669-453D-8C75-07C41C1632E4}" type="datetimeFigureOut">
               <a:rPr lang="pt-BR" smtClean="0"/>
-              <a:t>23/10/2020</a:t>
+              <a:t>12/11/2020</a:t>
             </a:fld>
             <a:endParaRPr lang="pt-BR"/>
           </a:p>
@@ -687,10 +681,9 @@
           <a:lstStyle/>
           <a:p>
             <a:r>
-              <a:rPr lang="pt-BR" smtClean="0"/>
+              <a:rPr lang="pt-BR"/>
               <a:t>Clique para editar o título mestre</a:t>
             </a:r>
-            <a:endParaRPr lang="pt-BR"/>
           </a:p>
         </p:txBody>
       </p:sp>
@@ -711,38 +704,37 @@
           <a:p>
             <a:pPr lvl="0"/>
             <a:r>
-              <a:rPr lang="pt-BR" smtClean="0"/>
+              <a:rPr lang="pt-BR"/>
               <a:t>Clique para editar o texto mestre</a:t>
             </a:r>
           </a:p>
           <a:p>
             <a:pPr lvl="1"/>
             <a:r>
-              <a:rPr lang="pt-BR" smtClean="0"/>
+              <a:rPr lang="pt-BR"/>
               <a:t>Segundo nível</a:t>
             </a:r>
           </a:p>
           <a:p>
             <a:pPr lvl="2"/>
             <a:r>
-              <a:rPr lang="pt-BR" smtClean="0"/>
+              <a:rPr lang="pt-BR"/>
               <a:t>Terceiro nível</a:t>
             </a:r>
           </a:p>
           <a:p>
             <a:pPr lvl="3"/>
             <a:r>
-              <a:rPr lang="pt-BR" smtClean="0"/>
+              <a:rPr lang="pt-BR"/>
               <a:t>Quarto nível</a:t>
             </a:r>
           </a:p>
           <a:p>
             <a:pPr lvl="4"/>
             <a:r>
-              <a:rPr lang="pt-BR" smtClean="0"/>
+              <a:rPr lang="pt-BR"/>
               <a:t>Quinto nível</a:t>
             </a:r>
-            <a:endParaRPr lang="pt-BR"/>
           </a:p>
         </p:txBody>
       </p:sp>
@@ -763,7 +755,7 @@
           <a:p>
             <a:fld id="{6F6F9BBC-5669-453D-8C75-07C41C1632E4}" type="datetimeFigureOut">
               <a:rPr lang="pt-BR" smtClean="0"/>
-              <a:t>23/10/2020</a:t>
+              <a:t>12/11/2020</a:t>
             </a:fld>
             <a:endParaRPr lang="pt-BR"/>
           </a:p>
@@ -866,10 +858,9 @@
           </a:lstStyle>
           <a:p>
             <a:r>
-              <a:rPr lang="pt-BR" smtClean="0"/>
+              <a:rPr lang="pt-BR"/>
               <a:t>Clique para editar o título mestre</a:t>
             </a:r>
-            <a:endParaRPr lang="pt-BR"/>
           </a:p>
         </p:txBody>
       </p:sp>
@@ -986,7 +977,7 @@
           <a:p>
             <a:pPr lvl="0"/>
             <a:r>
-              <a:rPr lang="pt-BR" smtClean="0"/>
+              <a:rPr lang="pt-BR"/>
               <a:t>Clique para editar o texto mestre</a:t>
             </a:r>
           </a:p>
@@ -1009,7 +1000,7 @@
           <a:p>
             <a:fld id="{6F6F9BBC-5669-453D-8C75-07C41C1632E4}" type="datetimeFigureOut">
               <a:rPr lang="pt-BR" smtClean="0"/>
-              <a:t>23/10/2020</a:t>
+              <a:t>12/11/2020</a:t>
             </a:fld>
             <a:endParaRPr lang="pt-BR"/>
           </a:p>
@@ -1103,10 +1094,9 @@
           <a:lstStyle/>
           <a:p>
             <a:r>
-              <a:rPr lang="pt-BR" smtClean="0"/>
+              <a:rPr lang="pt-BR"/>
               <a:t>Clique para editar o título mestre</a:t>
             </a:r>
-            <a:endParaRPr lang="pt-BR"/>
           </a:p>
         </p:txBody>
       </p:sp>
@@ -1132,38 +1122,37 @@
           <a:p>
             <a:pPr lvl="0"/>
             <a:r>
-              <a:rPr lang="pt-BR" smtClean="0"/>
+              <a:rPr lang="pt-BR"/>
               <a:t>Clique para editar o texto mestre</a:t>
             </a:r>
           </a:p>
           <a:p>
             <a:pPr lvl="1"/>
             <a:r>
-              <a:rPr lang="pt-BR" smtClean="0"/>
+              <a:rPr lang="pt-BR"/>
               <a:t>Segundo nível</a:t>
             </a:r>
           </a:p>
           <a:p>
             <a:pPr lvl="2"/>
             <a:r>
-              <a:rPr lang="pt-BR" smtClean="0"/>
+              <a:rPr lang="pt-BR"/>
               <a:t>Terceiro nível</a:t>
             </a:r>
           </a:p>
           <a:p>
             <a:pPr lvl="3"/>
             <a:r>
-              <a:rPr lang="pt-BR" smtClean="0"/>
+              <a:rPr lang="pt-BR"/>
               <a:t>Quarto nível</a:t>
             </a:r>
           </a:p>
           <a:p>
             <a:pPr lvl="4"/>
             <a:r>
-              <a:rPr lang="pt-BR" smtClean="0"/>
+              <a:rPr lang="pt-BR"/>
               <a:t>Quinto nível</a:t>
             </a:r>
-            <a:endParaRPr lang="pt-BR"/>
           </a:p>
         </p:txBody>
       </p:sp>
@@ -1189,38 +1178,37 @@
           <a:p>
             <a:pPr lvl="0"/>
             <a:r>
-              <a:rPr lang="pt-BR" smtClean="0"/>
+              <a:rPr lang="pt-BR"/>
               <a:t>Clique para editar o texto mestre</a:t>
             </a:r>
           </a:p>
           <a:p>
             <a:pPr lvl="1"/>
             <a:r>
-              <a:rPr lang="pt-BR" smtClean="0"/>
+              <a:rPr lang="pt-BR"/>
               <a:t>Segundo nível</a:t>
             </a:r>
           </a:p>
           <a:p>
             <a:pPr lvl="2"/>
             <a:r>
-              <a:rPr lang="pt-BR" smtClean="0"/>
+              <a:rPr lang="pt-BR"/>
               <a:t>Terceiro nível</a:t>
             </a:r>
           </a:p>
           <a:p>
             <a:pPr lvl="3"/>
             <a:r>
-              <a:rPr lang="pt-BR" smtClean="0"/>
+              <a:rPr lang="pt-BR"/>
               <a:t>Quarto nível</a:t>
             </a:r>
           </a:p>
           <a:p>
             <a:pPr lvl="4"/>
             <a:r>
-              <a:rPr lang="pt-BR" smtClean="0"/>
+              <a:rPr lang="pt-BR"/>
               <a:t>Quinto nível</a:t>
             </a:r>
-            <a:endParaRPr lang="pt-BR"/>
           </a:p>
         </p:txBody>
       </p:sp>
@@ -1241,7 +1229,7 @@
           <a:p>
             <a:fld id="{6F6F9BBC-5669-453D-8C75-07C41C1632E4}" type="datetimeFigureOut">
               <a:rPr lang="pt-BR" smtClean="0"/>
-              <a:t>23/10/2020</a:t>
+              <a:t>12/11/2020</a:t>
             </a:fld>
             <a:endParaRPr lang="pt-BR"/>
           </a:p>
@@ -1340,10 +1328,9 @@
           <a:lstStyle/>
           <a:p>
             <a:r>
-              <a:rPr lang="pt-BR" smtClean="0"/>
+              <a:rPr lang="pt-BR"/>
               <a:t>Clique para editar o título mestre</a:t>
             </a:r>
-            <a:endParaRPr lang="pt-BR"/>
           </a:p>
         </p:txBody>
       </p:sp>
@@ -1406,7 +1393,7 @@
           <a:p>
             <a:pPr lvl="0"/>
             <a:r>
-              <a:rPr lang="pt-BR" smtClean="0"/>
+              <a:rPr lang="pt-BR"/>
               <a:t>Clique para editar o texto mestre</a:t>
             </a:r>
           </a:p>
@@ -1434,38 +1421,37 @@
           <a:p>
             <a:pPr lvl="0"/>
             <a:r>
-              <a:rPr lang="pt-BR" smtClean="0"/>
+              <a:rPr lang="pt-BR"/>
               <a:t>Clique para editar o texto mestre</a:t>
             </a:r>
           </a:p>
           <a:p>
             <a:pPr lvl="1"/>
             <a:r>
-              <a:rPr lang="pt-BR" smtClean="0"/>
+              <a:rPr lang="pt-BR"/>
               <a:t>Segundo nível</a:t>
             </a:r>
           </a:p>
           <a:p>
             <a:pPr lvl="2"/>
             <a:r>
-              <a:rPr lang="pt-BR" smtClean="0"/>
+              <a:rPr lang="pt-BR"/>
               <a:t>Terceiro nível</a:t>
             </a:r>
           </a:p>
           <a:p>
             <a:pPr lvl="3"/>
             <a:r>
-              <a:rPr lang="pt-BR" smtClean="0"/>
+              <a:rPr lang="pt-BR"/>
               <a:t>Quarto nível</a:t>
             </a:r>
           </a:p>
           <a:p>
             <a:pPr lvl="4"/>
             <a:r>
-              <a:rPr lang="pt-BR" smtClean="0"/>
+              <a:rPr lang="pt-BR"/>
               <a:t>Quinto nível</a:t>
             </a:r>
-            <a:endParaRPr lang="pt-BR"/>
           </a:p>
         </p:txBody>
       </p:sp>
@@ -1528,7 +1514,7 @@
           <a:p>
             <a:pPr lvl="0"/>
             <a:r>
-              <a:rPr lang="pt-BR" smtClean="0"/>
+              <a:rPr lang="pt-BR"/>
               <a:t>Clique para editar o texto mestre</a:t>
             </a:r>
           </a:p>
@@ -1556,38 +1542,37 @@
           <a:p>
             <a:pPr lvl="0"/>
             <a:r>
-              <a:rPr lang="pt-BR" smtClean="0"/>
+              <a:rPr lang="pt-BR"/>
               <a:t>Clique para editar o texto mestre</a:t>
             </a:r>
           </a:p>
           <a:p>
             <a:pPr lvl="1"/>
             <a:r>
-              <a:rPr lang="pt-BR" smtClean="0"/>
+              <a:rPr lang="pt-BR"/>
               <a:t>Segundo nível</a:t>
             </a:r>
           </a:p>
           <a:p>
             <a:pPr lvl="2"/>
             <a:r>
-              <a:rPr lang="pt-BR" smtClean="0"/>
+              <a:rPr lang="pt-BR"/>
               <a:t>Terceiro nível</a:t>
             </a:r>
           </a:p>
           <a:p>
             <a:pPr lvl="3"/>
             <a:r>
-              <a:rPr lang="pt-BR" smtClean="0"/>
+              <a:rPr lang="pt-BR"/>
               <a:t>Quarto nível</a:t>
             </a:r>
           </a:p>
           <a:p>
             <a:pPr lvl="4"/>
             <a:r>
-              <a:rPr lang="pt-BR" smtClean="0"/>
+              <a:rPr lang="pt-BR"/>
               <a:t>Quinto nível</a:t>
             </a:r>
-            <a:endParaRPr lang="pt-BR"/>
           </a:p>
         </p:txBody>
       </p:sp>
@@ -1608,7 +1593,7 @@
           <a:p>
             <a:fld id="{6F6F9BBC-5669-453D-8C75-07C41C1632E4}" type="datetimeFigureOut">
               <a:rPr lang="pt-BR" smtClean="0"/>
-              <a:t>23/10/2020</a:t>
+              <a:t>12/11/2020</a:t>
             </a:fld>
             <a:endParaRPr lang="pt-BR"/>
           </a:p>
@@ -1702,10 +1687,9 @@
           <a:lstStyle/>
           <a:p>
             <a:r>
-              <a:rPr lang="pt-BR" smtClean="0"/>
+              <a:rPr lang="pt-BR"/>
               <a:t>Clique para editar o título mestre</a:t>
             </a:r>
-            <a:endParaRPr lang="pt-BR"/>
           </a:p>
         </p:txBody>
       </p:sp>
@@ -1726,7 +1710,7 @@
           <a:p>
             <a:fld id="{6F6F9BBC-5669-453D-8C75-07C41C1632E4}" type="datetimeFigureOut">
               <a:rPr lang="pt-BR" smtClean="0"/>
-              <a:t>23/10/2020</a:t>
+              <a:t>12/11/2020</a:t>
             </a:fld>
             <a:endParaRPr lang="pt-BR"/>
           </a:p>
@@ -1821,7 +1805,7 @@
           <a:p>
             <a:fld id="{6F6F9BBC-5669-453D-8C75-07C41C1632E4}" type="datetimeFigureOut">
               <a:rPr lang="pt-BR" smtClean="0"/>
-              <a:t>23/10/2020</a:t>
+              <a:t>12/11/2020</a:t>
             </a:fld>
             <a:endParaRPr lang="pt-BR"/>
           </a:p>
@@ -1924,10 +1908,9 @@
           </a:lstStyle>
           <a:p>
             <a:r>
-              <a:rPr lang="pt-BR" smtClean="0"/>
+              <a:rPr lang="pt-BR"/>
               <a:t>Clique para editar o título mestre</a:t>
             </a:r>
-            <a:endParaRPr lang="pt-BR"/>
           </a:p>
         </p:txBody>
       </p:sp>
@@ -1981,38 +1964,37 @@
           <a:p>
             <a:pPr lvl="0"/>
             <a:r>
-              <a:rPr lang="pt-BR" smtClean="0"/>
+              <a:rPr lang="pt-BR"/>
               <a:t>Clique para editar o texto mestre</a:t>
             </a:r>
           </a:p>
           <a:p>
             <a:pPr lvl="1"/>
             <a:r>
-              <a:rPr lang="pt-BR" smtClean="0"/>
+              <a:rPr lang="pt-BR"/>
               <a:t>Segundo nível</a:t>
             </a:r>
           </a:p>
           <a:p>
             <a:pPr lvl="2"/>
             <a:r>
-              <a:rPr lang="pt-BR" smtClean="0"/>
+              <a:rPr lang="pt-BR"/>
               <a:t>Terceiro nível</a:t>
             </a:r>
           </a:p>
           <a:p>
             <a:pPr lvl="3"/>
             <a:r>
-              <a:rPr lang="pt-BR" smtClean="0"/>
+              <a:rPr lang="pt-BR"/>
               <a:t>Quarto nível</a:t>
             </a:r>
           </a:p>
           <a:p>
             <a:pPr lvl="4"/>
             <a:r>
-              <a:rPr lang="pt-BR" smtClean="0"/>
+              <a:rPr lang="pt-BR"/>
               <a:t>Quinto nível</a:t>
             </a:r>
-            <a:endParaRPr lang="pt-BR"/>
           </a:p>
         </p:txBody>
       </p:sp>
@@ -2075,7 +2057,7 @@
           <a:p>
             <a:pPr lvl="0"/>
             <a:r>
-              <a:rPr lang="pt-BR" smtClean="0"/>
+              <a:rPr lang="pt-BR"/>
               <a:t>Clique para editar o texto mestre</a:t>
             </a:r>
           </a:p>
@@ -2098,7 +2080,7 @@
           <a:p>
             <a:fld id="{6F6F9BBC-5669-453D-8C75-07C41C1632E4}" type="datetimeFigureOut">
               <a:rPr lang="pt-BR" smtClean="0"/>
-              <a:t>23/10/2020</a:t>
+              <a:t>12/11/2020</a:t>
             </a:fld>
             <a:endParaRPr lang="pt-BR"/>
           </a:p>
@@ -2201,10 +2183,9 @@
           </a:lstStyle>
           <a:p>
             <a:r>
-              <a:rPr lang="pt-BR" smtClean="0"/>
+              <a:rPr lang="pt-BR"/>
               <a:t>Clique para editar o título mestre</a:t>
             </a:r>
-            <a:endParaRPr lang="pt-BR"/>
           </a:p>
         </p:txBody>
       </p:sp>
@@ -2328,7 +2309,7 @@
           <a:p>
             <a:pPr lvl="0"/>
             <a:r>
-              <a:rPr lang="pt-BR" smtClean="0"/>
+              <a:rPr lang="pt-BR"/>
               <a:t>Clique para editar o texto mestre</a:t>
             </a:r>
           </a:p>
@@ -2351,7 +2332,7 @@
           <a:p>
             <a:fld id="{6F6F9BBC-5669-453D-8C75-07C41C1632E4}" type="datetimeFigureOut">
               <a:rPr lang="pt-BR" smtClean="0"/>
-              <a:t>23/10/2020</a:t>
+              <a:t>12/11/2020</a:t>
             </a:fld>
             <a:endParaRPr lang="pt-BR"/>
           </a:p>
@@ -2460,10 +2441,9 @@
           <a:lstStyle/>
           <a:p>
             <a:r>
-              <a:rPr lang="pt-BR" smtClean="0"/>
+              <a:rPr lang="pt-BR"/>
               <a:t>Clique para editar o título mestre</a:t>
             </a:r>
-            <a:endParaRPr lang="pt-BR"/>
           </a:p>
         </p:txBody>
       </p:sp>
@@ -2494,38 +2474,37 @@
           <a:p>
             <a:pPr lvl="0"/>
             <a:r>
-              <a:rPr lang="pt-BR" smtClean="0"/>
+              <a:rPr lang="pt-BR"/>
               <a:t>Clique para editar o texto mestre</a:t>
             </a:r>
           </a:p>
           <a:p>
             <a:pPr lvl="1"/>
             <a:r>
-              <a:rPr lang="pt-BR" smtClean="0"/>
+              <a:rPr lang="pt-BR"/>
               <a:t>Segundo nível</a:t>
             </a:r>
           </a:p>
           <a:p>
             <a:pPr lvl="2"/>
             <a:r>
-              <a:rPr lang="pt-BR" smtClean="0"/>
+              <a:rPr lang="pt-BR"/>
               <a:t>Terceiro nível</a:t>
             </a:r>
           </a:p>
           <a:p>
             <a:pPr lvl="3"/>
             <a:r>
-              <a:rPr lang="pt-BR" smtClean="0"/>
+              <a:rPr lang="pt-BR"/>
               <a:t>Quarto nível</a:t>
             </a:r>
           </a:p>
           <a:p>
             <a:pPr lvl="4"/>
             <a:r>
-              <a:rPr lang="pt-BR" smtClean="0"/>
+              <a:rPr lang="pt-BR"/>
               <a:t>Quinto nível</a:t>
             </a:r>
-            <a:endParaRPr lang="pt-BR"/>
           </a:p>
         </p:txBody>
       </p:sp>
@@ -2564,7 +2543,7 @@
           <a:p>
             <a:fld id="{6F6F9BBC-5669-453D-8C75-07C41C1632E4}" type="datetimeFigureOut">
               <a:rPr lang="pt-BR" smtClean="0"/>
-              <a:t>23/10/2020</a:t>
+              <a:t>12/11/2020</a:t>
             </a:fld>
             <a:endParaRPr lang="pt-BR"/>
           </a:p>
@@ -2992,37 +2971,36 @@
           <a:lstStyle/>
           <a:p>
             <a:r>
-              <a:rPr lang="pt-BR" sz="2800" dirty="0" smtClean="0"/>
+              <a:rPr lang="pt-BR" sz="2800" dirty="0"/>
               <a:t>Modelo Conceitual de Negócio</a:t>
             </a:r>
-            <a:endParaRPr lang="pt-BR" sz="2800" dirty="0"/>
           </a:p>
         </p:txBody>
       </p:sp>
       <p:pic>
         <p:nvPicPr>
-          <p:cNvPr id="2" name="Imagem 1"/>
+          <p:cNvPr id="5" name="Imagem 4">
+            <a:extLst>
+              <a:ext uri="{FF2B5EF4-FFF2-40B4-BE49-F238E27FC236}">
+                <a16:creationId xmlns:a16="http://schemas.microsoft.com/office/drawing/2014/main" id="{86290536-E47F-468C-BA7F-ADE05B564E3A}"/>
+              </a:ext>
+            </a:extLst>
+          </p:cNvPr>
           <p:cNvPicPr>
             <a:picLocks noChangeAspect="1"/>
           </p:cNvPicPr>
           <p:nvPr/>
         </p:nvPicPr>
         <p:blipFill>
-          <a:blip r:embed="rId2">
-            <a:extLst>
-              <a:ext uri="{28A0092B-C50C-407E-A947-70E740481C1C}">
-                <a14:useLocalDpi xmlns:a14="http://schemas.microsoft.com/office/drawing/2010/main" val="0"/>
-              </a:ext>
-            </a:extLst>
-          </a:blip>
+          <a:blip r:embed="rId2"/>
           <a:stretch>
             <a:fillRect/>
           </a:stretch>
         </p:blipFill>
         <p:spPr>
           <a:xfrm>
-            <a:off x="78464" y="1056783"/>
-            <a:ext cx="12035073" cy="5620065"/>
+            <a:off x="300361" y="850792"/>
+            <a:ext cx="11591277" cy="5684240"/>
           </a:xfrm>
           <a:prstGeom prst="rect">
             <a:avLst/>

</xml_diff>